<commit_message>
ALR stuff for day 2
</commit_message>
<xml_diff>
--- a/slides/slide_output/1P06_RCommunity.pptx
+++ b/slides/slide_output/1P06_RCommunity.pptx
@@ -7,13 +7,14 @@
   <p:sldIdLst>
     <p:sldId id="256" r:id="rId2"/>
     <p:sldId id="275" r:id="rId3"/>
-    <p:sldId id="261" r:id="rId4"/>
-    <p:sldId id="260" r:id="rId5"/>
-    <p:sldId id="273" r:id="rId6"/>
-    <p:sldId id="271" r:id="rId7"/>
-    <p:sldId id="262" r:id="rId8"/>
-    <p:sldId id="268" r:id="rId9"/>
-    <p:sldId id="272" r:id="rId10"/>
+    <p:sldId id="277" r:id="rId4"/>
+    <p:sldId id="278" r:id="rId5"/>
+    <p:sldId id="276" r:id="rId6"/>
+    <p:sldId id="261" r:id="rId7"/>
+    <p:sldId id="260" r:id="rId8"/>
+    <p:sldId id="262" r:id="rId9"/>
+    <p:sldId id="268" r:id="rId10"/>
+    <p:sldId id="272" r:id="rId11"/>
   </p:sldIdLst>
   <p:sldSz cx="12192000" cy="6858000"/>
   <p:notesSz cx="6858000" cy="9144000"/>
@@ -114,10 +115,25 @@
   </p:defaultTextStyle>
   <p:extLst>
     <p:ext uri="{EFAFB233-063F-42B5-8137-9DF3F51BA10A}">
-      <p15:sldGuideLst xmlns:p15="http://schemas.microsoft.com/office/powerpoint/2012/main" xmlns=""/>
+      <p15:sldGuideLst xmlns:p15="http://schemas.microsoft.com/office/powerpoint/2012/main">
+        <p15:guide id="1" orient="horz" pos="2160">
+          <p15:clr>
+            <a:srgbClr val="A4A3A4"/>
+          </p15:clr>
+        </p15:guide>
+        <p15:guide id="2" pos="3840">
+          <p15:clr>
+            <a:srgbClr val="A4A3A4"/>
+          </p15:clr>
+        </p15:guide>
+      </p15:sldGuideLst>
     </p:ext>
   </p:extLst>
 </p:presentation>
+</file>
+
+<file path=ppt/revisionInfo.xml><?xml version="1.0" encoding="utf-8"?>
+<p1510:revInfo xmlns:a="http://schemas.openxmlformats.org/drawingml/2006/main" xmlns:r="http://schemas.openxmlformats.org/officeDocument/2006/relationships" xmlns:p1510="http://schemas.microsoft.com/office/powerpoint/2015/10/main"/>
 </file>
 
 <file path=ppt/slideLayouts/slideLayout1.xml><?xml version="1.0" encoding="utf-8"?>
@@ -162,10 +178,9 @@
           </a:lstStyle>
           <a:p>
             <a:r>
-              <a:rPr lang="en-US" smtClean="0"/>
+              <a:rPr lang="en-US"/>
               <a:t>Click to edit Master title style</a:t>
             </a:r>
-            <a:endParaRPr lang="en-US"/>
           </a:p>
         </p:txBody>
       </p:sp>
@@ -227,10 +242,9 @@
           </a:lstStyle>
           <a:p>
             <a:r>
-              <a:rPr lang="en-US" smtClean="0"/>
+              <a:rPr lang="en-US"/>
               <a:t>Click to edit Master subtitle style</a:t>
             </a:r>
-            <a:endParaRPr lang="en-US"/>
           </a:p>
         </p:txBody>
       </p:sp>
@@ -251,7 +265,7 @@
           <a:p>
             <a:fld id="{8FF27611-9908-4509-911E-3BBF2CF0A8B4}" type="datetimeFigureOut">
               <a:rPr lang="en-US" smtClean="0"/>
-              <a:t>8/20/2017</a:t>
+              <a:t>8/21/2017</a:t>
             </a:fld>
             <a:endParaRPr lang="en-US"/>
           </a:p>
@@ -345,10 +359,9 @@
           <a:lstStyle/>
           <a:p>
             <a:r>
-              <a:rPr lang="en-US" smtClean="0"/>
+              <a:rPr lang="en-US"/>
               <a:t>Click to edit Master title style</a:t>
             </a:r>
-            <a:endParaRPr lang="en-US"/>
           </a:p>
         </p:txBody>
       </p:sp>
@@ -369,38 +382,37 @@
           <a:p>
             <a:pPr lvl="0"/>
             <a:r>
-              <a:rPr lang="en-US" smtClean="0"/>
+              <a:rPr lang="en-US"/>
               <a:t>Click to edit Master text styles</a:t>
             </a:r>
           </a:p>
           <a:p>
             <a:pPr lvl="1"/>
             <a:r>
-              <a:rPr lang="en-US" smtClean="0"/>
+              <a:rPr lang="en-US"/>
               <a:t>Second level</a:t>
             </a:r>
           </a:p>
           <a:p>
             <a:pPr lvl="2"/>
             <a:r>
-              <a:rPr lang="en-US" smtClean="0"/>
+              <a:rPr lang="en-US"/>
               <a:t>Third level</a:t>
             </a:r>
           </a:p>
           <a:p>
             <a:pPr lvl="3"/>
             <a:r>
-              <a:rPr lang="en-US" smtClean="0"/>
+              <a:rPr lang="en-US"/>
               <a:t>Fourth level</a:t>
             </a:r>
           </a:p>
           <a:p>
             <a:pPr lvl="4"/>
             <a:r>
-              <a:rPr lang="en-US" smtClean="0"/>
+              <a:rPr lang="en-US"/>
               <a:t>Fifth level</a:t>
             </a:r>
-            <a:endParaRPr lang="en-US"/>
           </a:p>
         </p:txBody>
       </p:sp>
@@ -421,7 +433,7 @@
           <a:p>
             <a:fld id="{8FF27611-9908-4509-911E-3BBF2CF0A8B4}" type="datetimeFigureOut">
               <a:rPr lang="en-US" smtClean="0"/>
-              <a:t>8/20/2017</a:t>
+              <a:t>8/21/2017</a:t>
             </a:fld>
             <a:endParaRPr lang="en-US"/>
           </a:p>
@@ -520,10 +532,9 @@
           <a:lstStyle/>
           <a:p>
             <a:r>
-              <a:rPr lang="en-US" smtClean="0"/>
+              <a:rPr lang="en-US"/>
               <a:t>Click to edit Master title style</a:t>
             </a:r>
-            <a:endParaRPr lang="en-US"/>
           </a:p>
         </p:txBody>
       </p:sp>
@@ -549,38 +560,37 @@
           <a:p>
             <a:pPr lvl="0"/>
             <a:r>
-              <a:rPr lang="en-US" smtClean="0"/>
+              <a:rPr lang="en-US"/>
               <a:t>Click to edit Master text styles</a:t>
             </a:r>
           </a:p>
           <a:p>
             <a:pPr lvl="1"/>
             <a:r>
-              <a:rPr lang="en-US" smtClean="0"/>
+              <a:rPr lang="en-US"/>
               <a:t>Second level</a:t>
             </a:r>
           </a:p>
           <a:p>
             <a:pPr lvl="2"/>
             <a:r>
-              <a:rPr lang="en-US" smtClean="0"/>
+              <a:rPr lang="en-US"/>
               <a:t>Third level</a:t>
             </a:r>
           </a:p>
           <a:p>
             <a:pPr lvl="3"/>
             <a:r>
-              <a:rPr lang="en-US" smtClean="0"/>
+              <a:rPr lang="en-US"/>
               <a:t>Fourth level</a:t>
             </a:r>
           </a:p>
           <a:p>
             <a:pPr lvl="4"/>
             <a:r>
-              <a:rPr lang="en-US" smtClean="0"/>
+              <a:rPr lang="en-US"/>
               <a:t>Fifth level</a:t>
             </a:r>
-            <a:endParaRPr lang="en-US"/>
           </a:p>
         </p:txBody>
       </p:sp>
@@ -601,7 +611,7 @@
           <a:p>
             <a:fld id="{8FF27611-9908-4509-911E-3BBF2CF0A8B4}" type="datetimeFigureOut">
               <a:rPr lang="en-US" smtClean="0"/>
-              <a:t>8/20/2017</a:t>
+              <a:t>8/21/2017</a:t>
             </a:fld>
             <a:endParaRPr lang="en-US"/>
           </a:p>
@@ -695,10 +705,9 @@
           <a:lstStyle/>
           <a:p>
             <a:r>
-              <a:rPr lang="en-US" smtClean="0"/>
+              <a:rPr lang="en-US"/>
               <a:t>Click to edit Master title style</a:t>
             </a:r>
-            <a:endParaRPr lang="en-US"/>
           </a:p>
         </p:txBody>
       </p:sp>
@@ -719,38 +728,37 @@
           <a:p>
             <a:pPr lvl="0"/>
             <a:r>
-              <a:rPr lang="en-US" smtClean="0"/>
+              <a:rPr lang="en-US"/>
               <a:t>Click to edit Master text styles</a:t>
             </a:r>
           </a:p>
           <a:p>
             <a:pPr lvl="1"/>
             <a:r>
-              <a:rPr lang="en-US" smtClean="0"/>
+              <a:rPr lang="en-US"/>
               <a:t>Second level</a:t>
             </a:r>
           </a:p>
           <a:p>
             <a:pPr lvl="2"/>
             <a:r>
-              <a:rPr lang="en-US" smtClean="0"/>
+              <a:rPr lang="en-US"/>
               <a:t>Third level</a:t>
             </a:r>
           </a:p>
           <a:p>
             <a:pPr lvl="3"/>
             <a:r>
-              <a:rPr lang="en-US" smtClean="0"/>
+              <a:rPr lang="en-US"/>
               <a:t>Fourth level</a:t>
             </a:r>
           </a:p>
           <a:p>
             <a:pPr lvl="4"/>
             <a:r>
-              <a:rPr lang="en-US" smtClean="0"/>
+              <a:rPr lang="en-US"/>
               <a:t>Fifth level</a:t>
             </a:r>
-            <a:endParaRPr lang="en-US"/>
           </a:p>
         </p:txBody>
       </p:sp>
@@ -771,7 +779,7 @@
           <a:p>
             <a:fld id="{8FF27611-9908-4509-911E-3BBF2CF0A8B4}" type="datetimeFigureOut">
               <a:rPr lang="en-US" smtClean="0"/>
-              <a:t>8/20/2017</a:t>
+              <a:t>8/21/2017</a:t>
             </a:fld>
             <a:endParaRPr lang="en-US"/>
           </a:p>
@@ -874,10 +882,9 @@
           </a:lstStyle>
           <a:p>
             <a:r>
-              <a:rPr lang="en-US" smtClean="0"/>
+              <a:rPr lang="en-US"/>
               <a:t>Click to edit Master title style</a:t>
             </a:r>
-            <a:endParaRPr lang="en-US"/>
           </a:p>
         </p:txBody>
       </p:sp>
@@ -994,7 +1001,7 @@
           <a:p>
             <a:pPr lvl="0"/>
             <a:r>
-              <a:rPr lang="en-US" smtClean="0"/>
+              <a:rPr lang="en-US"/>
               <a:t>Click to edit Master text styles</a:t>
             </a:r>
           </a:p>
@@ -1017,7 +1024,7 @@
           <a:p>
             <a:fld id="{8FF27611-9908-4509-911E-3BBF2CF0A8B4}" type="datetimeFigureOut">
               <a:rPr lang="en-US" smtClean="0"/>
-              <a:t>8/20/2017</a:t>
+              <a:t>8/21/2017</a:t>
             </a:fld>
             <a:endParaRPr lang="en-US"/>
           </a:p>
@@ -1111,10 +1118,9 @@
           <a:lstStyle/>
           <a:p>
             <a:r>
-              <a:rPr lang="en-US" smtClean="0"/>
+              <a:rPr lang="en-US"/>
               <a:t>Click to edit Master title style</a:t>
             </a:r>
-            <a:endParaRPr lang="en-US"/>
           </a:p>
         </p:txBody>
       </p:sp>
@@ -1140,38 +1146,37 @@
           <a:p>
             <a:pPr lvl="0"/>
             <a:r>
-              <a:rPr lang="en-US" smtClean="0"/>
+              <a:rPr lang="en-US"/>
               <a:t>Click to edit Master text styles</a:t>
             </a:r>
           </a:p>
           <a:p>
             <a:pPr lvl="1"/>
             <a:r>
-              <a:rPr lang="en-US" smtClean="0"/>
+              <a:rPr lang="en-US"/>
               <a:t>Second level</a:t>
             </a:r>
           </a:p>
           <a:p>
             <a:pPr lvl="2"/>
             <a:r>
-              <a:rPr lang="en-US" smtClean="0"/>
+              <a:rPr lang="en-US"/>
               <a:t>Third level</a:t>
             </a:r>
           </a:p>
           <a:p>
             <a:pPr lvl="3"/>
             <a:r>
-              <a:rPr lang="en-US" smtClean="0"/>
+              <a:rPr lang="en-US"/>
               <a:t>Fourth level</a:t>
             </a:r>
           </a:p>
           <a:p>
             <a:pPr lvl="4"/>
             <a:r>
-              <a:rPr lang="en-US" smtClean="0"/>
+              <a:rPr lang="en-US"/>
               <a:t>Fifth level</a:t>
             </a:r>
-            <a:endParaRPr lang="en-US"/>
           </a:p>
         </p:txBody>
       </p:sp>
@@ -1197,38 +1202,37 @@
           <a:p>
             <a:pPr lvl="0"/>
             <a:r>
-              <a:rPr lang="en-US" smtClean="0"/>
+              <a:rPr lang="en-US"/>
               <a:t>Click to edit Master text styles</a:t>
             </a:r>
           </a:p>
           <a:p>
             <a:pPr lvl="1"/>
             <a:r>
-              <a:rPr lang="en-US" smtClean="0"/>
+              <a:rPr lang="en-US"/>
               <a:t>Second level</a:t>
             </a:r>
           </a:p>
           <a:p>
             <a:pPr lvl="2"/>
             <a:r>
-              <a:rPr lang="en-US" smtClean="0"/>
+              <a:rPr lang="en-US"/>
               <a:t>Third level</a:t>
             </a:r>
           </a:p>
           <a:p>
             <a:pPr lvl="3"/>
             <a:r>
-              <a:rPr lang="en-US" smtClean="0"/>
+              <a:rPr lang="en-US"/>
               <a:t>Fourth level</a:t>
             </a:r>
           </a:p>
           <a:p>
             <a:pPr lvl="4"/>
             <a:r>
-              <a:rPr lang="en-US" smtClean="0"/>
+              <a:rPr lang="en-US"/>
               <a:t>Fifth level</a:t>
             </a:r>
-            <a:endParaRPr lang="en-US"/>
           </a:p>
         </p:txBody>
       </p:sp>
@@ -1249,7 +1253,7 @@
           <a:p>
             <a:fld id="{8FF27611-9908-4509-911E-3BBF2CF0A8B4}" type="datetimeFigureOut">
               <a:rPr lang="en-US" smtClean="0"/>
-              <a:t>8/20/2017</a:t>
+              <a:t>8/21/2017</a:t>
             </a:fld>
             <a:endParaRPr lang="en-US"/>
           </a:p>
@@ -1348,10 +1352,9 @@
           <a:lstStyle/>
           <a:p>
             <a:r>
-              <a:rPr lang="en-US" smtClean="0"/>
+              <a:rPr lang="en-US"/>
               <a:t>Click to edit Master title style</a:t>
             </a:r>
-            <a:endParaRPr lang="en-US"/>
           </a:p>
         </p:txBody>
       </p:sp>
@@ -1414,7 +1417,7 @@
           <a:p>
             <a:pPr lvl="0"/>
             <a:r>
-              <a:rPr lang="en-US" smtClean="0"/>
+              <a:rPr lang="en-US"/>
               <a:t>Click to edit Master text styles</a:t>
             </a:r>
           </a:p>
@@ -1442,38 +1445,37 @@
           <a:p>
             <a:pPr lvl="0"/>
             <a:r>
-              <a:rPr lang="en-US" smtClean="0"/>
+              <a:rPr lang="en-US"/>
               <a:t>Click to edit Master text styles</a:t>
             </a:r>
           </a:p>
           <a:p>
             <a:pPr lvl="1"/>
             <a:r>
-              <a:rPr lang="en-US" smtClean="0"/>
+              <a:rPr lang="en-US"/>
               <a:t>Second level</a:t>
             </a:r>
           </a:p>
           <a:p>
             <a:pPr lvl="2"/>
             <a:r>
-              <a:rPr lang="en-US" smtClean="0"/>
+              <a:rPr lang="en-US"/>
               <a:t>Third level</a:t>
             </a:r>
           </a:p>
           <a:p>
             <a:pPr lvl="3"/>
             <a:r>
-              <a:rPr lang="en-US" smtClean="0"/>
+              <a:rPr lang="en-US"/>
               <a:t>Fourth level</a:t>
             </a:r>
           </a:p>
           <a:p>
             <a:pPr lvl="4"/>
             <a:r>
-              <a:rPr lang="en-US" smtClean="0"/>
+              <a:rPr lang="en-US"/>
               <a:t>Fifth level</a:t>
             </a:r>
-            <a:endParaRPr lang="en-US"/>
           </a:p>
         </p:txBody>
       </p:sp>
@@ -1536,7 +1538,7 @@
           <a:p>
             <a:pPr lvl="0"/>
             <a:r>
-              <a:rPr lang="en-US" smtClean="0"/>
+              <a:rPr lang="en-US"/>
               <a:t>Click to edit Master text styles</a:t>
             </a:r>
           </a:p>
@@ -1564,38 +1566,37 @@
           <a:p>
             <a:pPr lvl="0"/>
             <a:r>
-              <a:rPr lang="en-US" smtClean="0"/>
+              <a:rPr lang="en-US"/>
               <a:t>Click to edit Master text styles</a:t>
             </a:r>
           </a:p>
           <a:p>
             <a:pPr lvl="1"/>
             <a:r>
-              <a:rPr lang="en-US" smtClean="0"/>
+              <a:rPr lang="en-US"/>
               <a:t>Second level</a:t>
             </a:r>
           </a:p>
           <a:p>
             <a:pPr lvl="2"/>
             <a:r>
-              <a:rPr lang="en-US" smtClean="0"/>
+              <a:rPr lang="en-US"/>
               <a:t>Third level</a:t>
             </a:r>
           </a:p>
           <a:p>
             <a:pPr lvl="3"/>
             <a:r>
-              <a:rPr lang="en-US" smtClean="0"/>
+              <a:rPr lang="en-US"/>
               <a:t>Fourth level</a:t>
             </a:r>
           </a:p>
           <a:p>
             <a:pPr lvl="4"/>
             <a:r>
-              <a:rPr lang="en-US" smtClean="0"/>
+              <a:rPr lang="en-US"/>
               <a:t>Fifth level</a:t>
             </a:r>
-            <a:endParaRPr lang="en-US"/>
           </a:p>
         </p:txBody>
       </p:sp>
@@ -1616,7 +1617,7 @@
           <a:p>
             <a:fld id="{8FF27611-9908-4509-911E-3BBF2CF0A8B4}" type="datetimeFigureOut">
               <a:rPr lang="en-US" smtClean="0"/>
-              <a:t>8/20/2017</a:t>
+              <a:t>8/21/2017</a:t>
             </a:fld>
             <a:endParaRPr lang="en-US"/>
           </a:p>
@@ -1710,10 +1711,9 @@
           <a:lstStyle/>
           <a:p>
             <a:r>
-              <a:rPr lang="en-US" smtClean="0"/>
+              <a:rPr lang="en-US"/>
               <a:t>Click to edit Master title style</a:t>
             </a:r>
-            <a:endParaRPr lang="en-US"/>
           </a:p>
         </p:txBody>
       </p:sp>
@@ -1734,7 +1734,7 @@
           <a:p>
             <a:fld id="{8FF27611-9908-4509-911E-3BBF2CF0A8B4}" type="datetimeFigureOut">
               <a:rPr lang="en-US" smtClean="0"/>
-              <a:t>8/20/2017</a:t>
+              <a:t>8/21/2017</a:t>
             </a:fld>
             <a:endParaRPr lang="en-US"/>
           </a:p>
@@ -1829,7 +1829,7 @@
           <a:p>
             <a:fld id="{8FF27611-9908-4509-911E-3BBF2CF0A8B4}" type="datetimeFigureOut">
               <a:rPr lang="en-US" smtClean="0"/>
-              <a:t>8/20/2017</a:t>
+              <a:t>8/21/2017</a:t>
             </a:fld>
             <a:endParaRPr lang="en-US"/>
           </a:p>
@@ -1932,10 +1932,9 @@
           </a:lstStyle>
           <a:p>
             <a:r>
-              <a:rPr lang="en-US" smtClean="0"/>
+              <a:rPr lang="en-US"/>
               <a:t>Click to edit Master title style</a:t>
             </a:r>
-            <a:endParaRPr lang="en-US"/>
           </a:p>
         </p:txBody>
       </p:sp>
@@ -1989,38 +1988,37 @@
           <a:p>
             <a:pPr lvl="0"/>
             <a:r>
-              <a:rPr lang="en-US" smtClean="0"/>
+              <a:rPr lang="en-US"/>
               <a:t>Click to edit Master text styles</a:t>
             </a:r>
           </a:p>
           <a:p>
             <a:pPr lvl="1"/>
             <a:r>
-              <a:rPr lang="en-US" smtClean="0"/>
+              <a:rPr lang="en-US"/>
               <a:t>Second level</a:t>
             </a:r>
           </a:p>
           <a:p>
             <a:pPr lvl="2"/>
             <a:r>
-              <a:rPr lang="en-US" smtClean="0"/>
+              <a:rPr lang="en-US"/>
               <a:t>Third level</a:t>
             </a:r>
           </a:p>
           <a:p>
             <a:pPr lvl="3"/>
             <a:r>
-              <a:rPr lang="en-US" smtClean="0"/>
+              <a:rPr lang="en-US"/>
               <a:t>Fourth level</a:t>
             </a:r>
           </a:p>
           <a:p>
             <a:pPr lvl="4"/>
             <a:r>
-              <a:rPr lang="en-US" smtClean="0"/>
+              <a:rPr lang="en-US"/>
               <a:t>Fifth level</a:t>
             </a:r>
-            <a:endParaRPr lang="en-US"/>
           </a:p>
         </p:txBody>
       </p:sp>
@@ -2083,7 +2081,7 @@
           <a:p>
             <a:pPr lvl="0"/>
             <a:r>
-              <a:rPr lang="en-US" smtClean="0"/>
+              <a:rPr lang="en-US"/>
               <a:t>Click to edit Master text styles</a:t>
             </a:r>
           </a:p>
@@ -2106,7 +2104,7 @@
           <a:p>
             <a:fld id="{8FF27611-9908-4509-911E-3BBF2CF0A8B4}" type="datetimeFigureOut">
               <a:rPr lang="en-US" smtClean="0"/>
-              <a:t>8/20/2017</a:t>
+              <a:t>8/21/2017</a:t>
             </a:fld>
             <a:endParaRPr lang="en-US"/>
           </a:p>
@@ -2209,10 +2207,9 @@
           </a:lstStyle>
           <a:p>
             <a:r>
-              <a:rPr lang="en-US" smtClean="0"/>
+              <a:rPr lang="en-US"/>
               <a:t>Click to edit Master title style</a:t>
             </a:r>
-            <a:endParaRPr lang="en-US"/>
           </a:p>
         </p:txBody>
       </p:sp>
@@ -2336,7 +2333,7 @@
           <a:p>
             <a:pPr lvl="0"/>
             <a:r>
-              <a:rPr lang="en-US" smtClean="0"/>
+              <a:rPr lang="en-US"/>
               <a:t>Click to edit Master text styles</a:t>
             </a:r>
           </a:p>
@@ -2359,7 +2356,7 @@
           <a:p>
             <a:fld id="{8FF27611-9908-4509-911E-3BBF2CF0A8B4}" type="datetimeFigureOut">
               <a:rPr lang="en-US" smtClean="0"/>
-              <a:t>8/20/2017</a:t>
+              <a:t>8/21/2017</a:t>
             </a:fld>
             <a:endParaRPr lang="en-US"/>
           </a:p>
@@ -2468,10 +2465,9 @@
           <a:lstStyle/>
           <a:p>
             <a:r>
-              <a:rPr lang="en-US" smtClean="0"/>
+              <a:rPr lang="en-US"/>
               <a:t>Click to edit Master title style</a:t>
             </a:r>
-            <a:endParaRPr lang="en-US"/>
           </a:p>
         </p:txBody>
       </p:sp>
@@ -2502,38 +2498,37 @@
           <a:p>
             <a:pPr lvl="0"/>
             <a:r>
-              <a:rPr lang="en-US" smtClean="0"/>
+              <a:rPr lang="en-US"/>
               <a:t>Click to edit Master text styles</a:t>
             </a:r>
           </a:p>
           <a:p>
             <a:pPr lvl="1"/>
             <a:r>
-              <a:rPr lang="en-US" smtClean="0"/>
+              <a:rPr lang="en-US"/>
               <a:t>Second level</a:t>
             </a:r>
           </a:p>
           <a:p>
             <a:pPr lvl="2"/>
             <a:r>
-              <a:rPr lang="en-US" smtClean="0"/>
+              <a:rPr lang="en-US"/>
               <a:t>Third level</a:t>
             </a:r>
           </a:p>
           <a:p>
             <a:pPr lvl="3"/>
             <a:r>
-              <a:rPr lang="en-US" smtClean="0"/>
+              <a:rPr lang="en-US"/>
               <a:t>Fourth level</a:t>
             </a:r>
           </a:p>
           <a:p>
             <a:pPr lvl="4"/>
             <a:r>
-              <a:rPr lang="en-US" smtClean="0"/>
+              <a:rPr lang="en-US"/>
               <a:t>Fifth level</a:t>
             </a:r>
-            <a:endParaRPr lang="en-US"/>
           </a:p>
         </p:txBody>
       </p:sp>
@@ -2572,7 +2567,7 @@
           <a:p>
             <a:fld id="{8FF27611-9908-4509-911E-3BBF2CF0A8B4}" type="datetimeFigureOut">
               <a:rPr lang="en-US" smtClean="0"/>
-              <a:t>8/20/2017</a:t>
+              <a:t>8/21/2017</a:t>
             </a:fld>
             <a:endParaRPr lang="en-US"/>
           </a:p>
@@ -2998,14 +2993,9 @@
           <a:lstStyle/>
           <a:p>
             <a:r>
-              <a:rPr lang="en-US" dirty="0" smtClean="0"/>
-              <a:t>R </a:t>
-            </a:r>
-            <a:r>
-              <a:rPr lang="en-US" dirty="0" smtClean="0"/>
-              <a:t>Community</a:t>
-            </a:r>
-            <a:endParaRPr lang="en-US" dirty="0"/>
+              <a:rPr lang="en-US" dirty="0"/>
+              <a:t>R Community</a:t>
+            </a:r>
           </a:p>
         </p:txBody>
       </p:sp>
@@ -3030,28 +3020,26 @@
           <a:lstStyle/>
           <a:p>
             <a:r>
-              <a:rPr lang="en-US" dirty="0" smtClean="0"/>
+              <a:rPr lang="en-US" dirty="0"/>
               <a:t>CAS R </a:t>
             </a:r>
             <a:r>
-              <a:rPr lang="en-US" dirty="0" err="1" smtClean="0"/>
+              <a:rPr lang="en-US" dirty="0" err="1"/>
               <a:t>Bootcamp</a:t>
             </a:r>
-            <a:endParaRPr lang="en-US" dirty="0" smtClean="0"/>
-          </a:p>
-          <a:p>
-            <a:r>
-              <a:rPr lang="en-US" dirty="0" smtClean="0"/>
+            <a:endParaRPr lang="en-US" dirty="0"/>
+          </a:p>
+          <a:p>
+            <a:r>
+              <a:rPr lang="en-US" dirty="0"/>
               <a:t>August 21, 2017</a:t>
             </a:r>
-            <a:endParaRPr lang="en-US" dirty="0" smtClean="0"/>
-          </a:p>
-          <a:p>
-            <a:r>
-              <a:rPr lang="en-US" dirty="0" smtClean="0"/>
+          </a:p>
+          <a:p>
+            <a:r>
+              <a:rPr lang="en-US" dirty="0"/>
               <a:t>Boston, Mass.</a:t>
             </a:r>
-            <a:endParaRPr lang="en-US" dirty="0"/>
           </a:p>
         </p:txBody>
       </p:sp>
@@ -3079,25 +3067,23 @@
           <a:p>
             <a:pPr algn="ctr"/>
             <a:r>
-              <a:rPr lang="en-US" sz="2800" dirty="0" smtClean="0"/>
+              <a:rPr lang="en-US" sz="2800" dirty="0"/>
               <a:t>Dan Murphy</a:t>
             </a:r>
-            <a:endParaRPr lang="en-US" sz="2800" dirty="0" smtClean="0"/>
           </a:p>
           <a:p>
             <a:pPr algn="ctr"/>
             <a:r>
-              <a:rPr lang="en-US" sz="2800" dirty="0" smtClean="0"/>
+              <a:rPr lang="en-US" sz="2800" dirty="0"/>
               <a:t>Brian Fannin</a:t>
             </a:r>
           </a:p>
           <a:p>
             <a:pPr algn="ctr"/>
             <a:r>
-              <a:rPr lang="en-US" sz="2800" dirty="0" smtClean="0"/>
+              <a:rPr lang="en-US" sz="2800" dirty="0"/>
               <a:t>Adam Rich</a:t>
             </a:r>
-            <a:endParaRPr lang="en-US" sz="2800" dirty="0"/>
           </a:p>
         </p:txBody>
       </p:sp>
@@ -3111,13 +3097,88 @@
   <p:clrMapOvr>
     <a:masterClrMapping/>
   </p:clrMapOvr>
-  <p:timing>
-    <p:tnLst>
-      <p:par>
-        <p:cTn id="1" dur="indefinite" restart="never" nodeType="tmRoot"/>
-      </p:par>
-    </p:tnLst>
-  </p:timing>
+</p:sld>
+</file>
+
+<file path=ppt/slides/slide10.xml><?xml version="1.0" encoding="utf-8"?>
+<p:sld xmlns:a="http://schemas.openxmlformats.org/drawingml/2006/main" xmlns:r="http://schemas.openxmlformats.org/officeDocument/2006/relationships" xmlns:p="http://schemas.openxmlformats.org/presentationml/2006/main">
+  <p:cSld>
+    <p:spTree>
+      <p:nvGrpSpPr>
+        <p:cNvPr id="1" name=""/>
+        <p:cNvGrpSpPr/>
+        <p:nvPr/>
+      </p:nvGrpSpPr>
+      <p:grpSpPr>
+        <a:xfrm>
+          <a:off x="0" y="0"/>
+          <a:ext cx="0" cy="0"/>
+          <a:chOff x="0" y="0"/>
+          <a:chExt cx="0" cy="0"/>
+        </a:xfrm>
+      </p:grpSpPr>
+      <p:sp>
+        <p:nvSpPr>
+          <p:cNvPr id="2" name="Title 1"/>
+          <p:cNvSpPr>
+            <a:spLocks noGrp="1"/>
+          </p:cNvSpPr>
+          <p:nvPr>
+            <p:ph type="title"/>
+          </p:nvPr>
+        </p:nvSpPr>
+        <p:spPr/>
+        <p:txBody>
+          <a:bodyPr/>
+          <a:lstStyle/>
+          <a:p>
+            <a:r>
+              <a:rPr lang="en-US" dirty="0">
+                <a:hlinkClick r:id="rId2"/>
+              </a:rPr>
+              <a:t>http://www.r-bloggers.com/</a:t>
+            </a:r>
+            <a:r>
+              <a:rPr lang="en-US" dirty="0"/>
+              <a:t> </a:t>
+            </a:r>
+          </a:p>
+        </p:txBody>
+      </p:sp>
+      <p:pic>
+        <p:nvPicPr>
+          <p:cNvPr id="4" name="Picture 3"/>
+          <p:cNvPicPr>
+            <a:picLocks noChangeAspect="1"/>
+          </p:cNvPicPr>
+          <p:nvPr/>
+        </p:nvPicPr>
+        <p:blipFill>
+          <a:blip r:embed="rId3"/>
+          <a:stretch>
+            <a:fillRect/>
+          </a:stretch>
+        </p:blipFill>
+        <p:spPr>
+          <a:xfrm>
+            <a:off x="2998865" y="1732880"/>
+            <a:ext cx="6678615" cy="4302256"/>
+          </a:xfrm>
+          <a:prstGeom prst="rect">
+            <a:avLst/>
+          </a:prstGeom>
+        </p:spPr>
+      </p:pic>
+    </p:spTree>
+    <p:extLst>
+      <p:ext uri="{BB962C8B-B14F-4D97-AF65-F5344CB8AC3E}">
+        <p14:creationId xmlns:p14="http://schemas.microsoft.com/office/powerpoint/2010/main" val="1400083673"/>
+      </p:ext>
+    </p:extLst>
+  </p:cSld>
+  <p:clrMapOvr>
+    <a:masterClrMapping/>
+  </p:clrMapOvr>
 </p:sld>
 </file>
 
@@ -3154,7 +3215,7 @@
           <a:lstStyle/>
           <a:p>
             <a:r>
-              <a:rPr lang="en-US" dirty="0" smtClean="0"/>
+              <a:rPr lang="en-US" dirty="0"/>
               <a:t>If you have a question…</a:t>
             </a:r>
             <a:endParaRPr lang="en-GB" dirty="0"/>
@@ -3177,34 +3238,28 @@
           <a:lstStyle/>
           <a:p>
             <a:r>
-              <a:rPr lang="en-US" dirty="0" smtClean="0"/>
+              <a:rPr lang="en-US" dirty="0"/>
               <a:t>Did you </a:t>
             </a:r>
             <a:r>
-              <a:rPr lang="en-US" dirty="0" err="1" smtClean="0"/>
+              <a:rPr lang="en-US" dirty="0" err="1"/>
               <a:t>google</a:t>
             </a:r>
             <a:r>
-              <a:rPr lang="en-US" dirty="0" smtClean="0"/>
+              <a:rPr lang="en-US" dirty="0"/>
               <a:t> it?</a:t>
             </a:r>
           </a:p>
           <a:p>
             <a:r>
-              <a:rPr lang="en-US" dirty="0" smtClean="0"/>
+              <a:rPr lang="en-US" dirty="0"/>
               <a:t>Yahoo it?</a:t>
             </a:r>
           </a:p>
           <a:p>
             <a:r>
-              <a:rPr lang="en-US" dirty="0" smtClean="0"/>
-              <a:t>Bing it?  (or is the past participle “bang”?)</a:t>
-            </a:r>
-          </a:p>
-          <a:p>
-            <a:r>
-              <a:rPr lang="en-US" dirty="0" smtClean="0"/>
-              <a:t>Duck-duck-go it?</a:t>
+              <a:rPr lang="en-US" dirty="0"/>
+              <a:t>Bing it?</a:t>
             </a:r>
           </a:p>
           <a:p>
@@ -3212,12 +3267,6 @@
               <a:buNone/>
             </a:pPr>
             <a:endParaRPr lang="en-US" dirty="0"/>
-          </a:p>
-          <a:p>
-            <a:pPr marL="0" indent="0">
-              <a:buNone/>
-            </a:pPr>
-            <a:endParaRPr lang="en-US" dirty="0" smtClean="0"/>
           </a:p>
         </p:txBody>
       </p:sp>
@@ -3253,6 +3302,404 @@
       </p:grpSpPr>
       <p:sp>
         <p:nvSpPr>
+          <p:cNvPr id="2" name="Title 1">
+            <a:extLst>
+              <a:ext uri="{FF2B5EF4-FFF2-40B4-BE49-F238E27FC236}">
+                <a16:creationId xmlns:a16="http://schemas.microsoft.com/office/drawing/2014/main" id="{6EE4EFF9-7AEA-4A4F-8FC2-BE4D3C429B1A}"/>
+              </a:ext>
+            </a:extLst>
+          </p:cNvPr>
+          <p:cNvSpPr>
+            <a:spLocks noGrp="1"/>
+          </p:cNvSpPr>
+          <p:nvPr>
+            <p:ph type="title"/>
+          </p:nvPr>
+        </p:nvSpPr>
+        <p:spPr/>
+        <p:txBody>
+          <a:bodyPr/>
+          <a:lstStyle/>
+          <a:p>
+            <a:r>
+              <a:rPr lang="en-US" dirty="0"/>
+              <a:t>Have an R Buddy</a:t>
+            </a:r>
+          </a:p>
+        </p:txBody>
+      </p:sp>
+      <p:sp>
+        <p:nvSpPr>
+          <p:cNvPr id="3" name="Content Placeholder 2">
+            <a:extLst>
+              <a:ext uri="{FF2B5EF4-FFF2-40B4-BE49-F238E27FC236}">
+                <a16:creationId xmlns:a16="http://schemas.microsoft.com/office/drawing/2014/main" id="{9E9ADC67-7445-47BD-9B4A-4230EF19C31D}"/>
+              </a:ext>
+            </a:extLst>
+          </p:cNvPr>
+          <p:cNvSpPr>
+            <a:spLocks noGrp="1"/>
+          </p:cNvSpPr>
+          <p:nvPr>
+            <p:ph idx="1"/>
+          </p:nvPr>
+        </p:nvSpPr>
+        <p:spPr>
+          <a:xfrm>
+            <a:off x="838200" y="1444487"/>
+            <a:ext cx="10515600" cy="4732476"/>
+          </a:xfrm>
+        </p:spPr>
+        <p:txBody>
+          <a:bodyPr>
+            <a:normAutofit/>
+          </a:bodyPr>
+          <a:lstStyle/>
+          <a:p>
+            <a:r>
+              <a:rPr lang="en-US" dirty="0"/>
+              <a:t>It is so much easier to learn a new language when you have someone to speak it with.  </a:t>
+            </a:r>
+          </a:p>
+          <a:p>
+            <a:r>
+              <a:rPr lang="en-US" dirty="0"/>
+              <a:t>If there are others at your company using R, get together to discuss what you are doing and learning.</a:t>
+            </a:r>
+          </a:p>
+          <a:p>
+            <a:r>
+              <a:rPr lang="en-US" dirty="0"/>
+              <a:t>If there is no one at your company who is using R, make some friends while you are here.  You can work together over email!</a:t>
+            </a:r>
+          </a:p>
+          <a:p>
+            <a:r>
+              <a:rPr lang="en-US" dirty="0"/>
+              <a:t>If you are really desperate for a buddy, email me.  Or if just moderately desperate email Dan or Brian.</a:t>
+            </a:r>
+          </a:p>
+          <a:p>
+            <a:pPr lvl="1"/>
+            <a:r>
+              <a:rPr lang="en-US" dirty="0">
+                <a:hlinkClick r:id="rId2"/>
+              </a:rPr>
+              <a:t>adamleerich@gmail.com</a:t>
+            </a:r>
+            <a:endParaRPr lang="en-US" dirty="0"/>
+          </a:p>
+          <a:p>
+            <a:pPr lvl="1"/>
+            <a:r>
+              <a:rPr lang="en-US" dirty="0">
+                <a:hlinkClick r:id="rId3"/>
+              </a:rPr>
+              <a:t>chiefmurphy@gmail.com</a:t>
+            </a:r>
+            <a:endParaRPr lang="en-US" dirty="0"/>
+          </a:p>
+          <a:p>
+            <a:pPr lvl="1"/>
+            <a:r>
+              <a:rPr lang="en-US" dirty="0">
+                <a:hlinkClick r:id="rId4"/>
+              </a:rPr>
+              <a:t>captain@pirategrunt.com</a:t>
+            </a:r>
+            <a:endParaRPr lang="en-US" dirty="0"/>
+          </a:p>
+          <a:p>
+            <a:pPr lvl="1"/>
+            <a:endParaRPr lang="en-US" dirty="0"/>
+          </a:p>
+        </p:txBody>
+      </p:sp>
+    </p:spTree>
+    <p:extLst>
+      <p:ext uri="{BB962C8B-B14F-4D97-AF65-F5344CB8AC3E}">
+        <p14:creationId xmlns:p14="http://schemas.microsoft.com/office/powerpoint/2010/main" val="2536057398"/>
+      </p:ext>
+    </p:extLst>
+  </p:cSld>
+  <p:clrMapOvr>
+    <a:masterClrMapping/>
+  </p:clrMapOvr>
+</p:sld>
+</file>
+
+<file path=ppt/slides/slide4.xml><?xml version="1.0" encoding="utf-8"?>
+<p:sld xmlns:a="http://schemas.openxmlformats.org/drawingml/2006/main" xmlns:r="http://schemas.openxmlformats.org/officeDocument/2006/relationships" xmlns:p="http://schemas.openxmlformats.org/presentationml/2006/main">
+  <p:cSld>
+    <p:spTree>
+      <p:nvGrpSpPr>
+        <p:cNvPr id="1" name=""/>
+        <p:cNvGrpSpPr/>
+        <p:nvPr/>
+      </p:nvGrpSpPr>
+      <p:grpSpPr>
+        <a:xfrm>
+          <a:off x="0" y="0"/>
+          <a:ext cx="0" cy="0"/>
+          <a:chOff x="0" y="0"/>
+          <a:chExt cx="0" cy="0"/>
+        </a:xfrm>
+      </p:grpSpPr>
+      <p:sp>
+        <p:nvSpPr>
+          <p:cNvPr id="2" name="Title 1">
+            <a:extLst>
+              <a:ext uri="{FF2B5EF4-FFF2-40B4-BE49-F238E27FC236}">
+                <a16:creationId xmlns:a16="http://schemas.microsoft.com/office/drawing/2014/main" id="{953F3972-D60C-4E24-9E3A-26F9DB8EAF73}"/>
+              </a:ext>
+            </a:extLst>
+          </p:cNvPr>
+          <p:cNvSpPr>
+            <a:spLocks noGrp="1"/>
+          </p:cNvSpPr>
+          <p:nvPr>
+            <p:ph type="title"/>
+          </p:nvPr>
+        </p:nvSpPr>
+        <p:spPr/>
+        <p:txBody>
+          <a:bodyPr/>
+          <a:lstStyle/>
+          <a:p>
+            <a:r>
+              <a:rPr lang="en-US" dirty="0"/>
+              <a:t>Find a User Group</a:t>
+            </a:r>
+          </a:p>
+        </p:txBody>
+      </p:sp>
+      <p:sp>
+        <p:nvSpPr>
+          <p:cNvPr id="3" name="Content Placeholder 2">
+            <a:extLst>
+              <a:ext uri="{FF2B5EF4-FFF2-40B4-BE49-F238E27FC236}">
+                <a16:creationId xmlns:a16="http://schemas.microsoft.com/office/drawing/2014/main" id="{C1D57446-7050-4473-898B-823D4C67734F}"/>
+              </a:ext>
+            </a:extLst>
+          </p:cNvPr>
+          <p:cNvSpPr>
+            <a:spLocks noGrp="1"/>
+          </p:cNvSpPr>
+          <p:nvPr>
+            <p:ph idx="1"/>
+          </p:nvPr>
+        </p:nvSpPr>
+        <p:spPr/>
+        <p:txBody>
+          <a:bodyPr/>
+          <a:lstStyle/>
+          <a:p>
+            <a:r>
+              <a:rPr lang="en-US" dirty="0"/>
+              <a:t>Meetup</a:t>
+            </a:r>
+          </a:p>
+          <a:p>
+            <a:r>
+              <a:rPr lang="en-US" dirty="0"/>
+              <a:t>Mango Solutions R Groups</a:t>
+            </a:r>
+          </a:p>
+          <a:p>
+            <a:r>
+              <a:rPr lang="en-US" dirty="0"/>
+              <a:t>Go to another seminar or conference</a:t>
+            </a:r>
+          </a:p>
+          <a:p>
+            <a:pPr lvl="1"/>
+            <a:r>
+              <a:rPr lang="en-US" dirty="0"/>
+              <a:t>The learning curve is steep</a:t>
+            </a:r>
+          </a:p>
+          <a:p>
+            <a:pPr lvl="1"/>
+            <a:r>
+              <a:rPr lang="en-US" dirty="0"/>
+              <a:t>One week will not be enough!</a:t>
+            </a:r>
+          </a:p>
+        </p:txBody>
+      </p:sp>
+    </p:spTree>
+    <p:extLst>
+      <p:ext uri="{BB962C8B-B14F-4D97-AF65-F5344CB8AC3E}">
+        <p14:creationId xmlns:p14="http://schemas.microsoft.com/office/powerpoint/2010/main" val="2153558171"/>
+      </p:ext>
+    </p:extLst>
+  </p:cSld>
+  <p:clrMapOvr>
+    <a:masterClrMapping/>
+  </p:clrMapOvr>
+</p:sld>
+</file>
+
+<file path=ppt/slides/slide5.xml><?xml version="1.0" encoding="utf-8"?>
+<p:sld xmlns:a="http://schemas.openxmlformats.org/drawingml/2006/main" xmlns:r="http://schemas.openxmlformats.org/officeDocument/2006/relationships" xmlns:p="http://schemas.openxmlformats.org/presentationml/2006/main">
+  <p:cSld>
+    <p:spTree>
+      <p:nvGrpSpPr>
+        <p:cNvPr id="1" name=""/>
+        <p:cNvGrpSpPr/>
+        <p:nvPr/>
+      </p:nvGrpSpPr>
+      <p:grpSpPr>
+        <a:xfrm>
+          <a:off x="0" y="0"/>
+          <a:ext cx="0" cy="0"/>
+          <a:chOff x="0" y="0"/>
+          <a:chExt cx="0" cy="0"/>
+        </a:xfrm>
+      </p:grpSpPr>
+      <p:sp>
+        <p:nvSpPr>
+          <p:cNvPr id="2" name="Title 1">
+            <a:extLst>
+              <a:ext uri="{FF2B5EF4-FFF2-40B4-BE49-F238E27FC236}">
+                <a16:creationId xmlns:a16="http://schemas.microsoft.com/office/drawing/2014/main" id="{211D5628-6FE3-4C39-85C8-5D3DA0EE16CD}"/>
+              </a:ext>
+            </a:extLst>
+          </p:cNvPr>
+          <p:cNvSpPr>
+            <a:spLocks noGrp="1"/>
+          </p:cNvSpPr>
+          <p:nvPr>
+            <p:ph type="title"/>
+          </p:nvPr>
+        </p:nvSpPr>
+        <p:spPr/>
+        <p:txBody>
+          <a:bodyPr/>
+          <a:lstStyle/>
+          <a:p>
+            <a:r>
+              <a:rPr lang="en-US" dirty="0" err="1"/>
+              <a:t>Cheatsheets</a:t>
+            </a:r>
+            <a:endParaRPr lang="en-US" dirty="0"/>
+          </a:p>
+        </p:txBody>
+      </p:sp>
+      <p:sp>
+        <p:nvSpPr>
+          <p:cNvPr id="3" name="Content Placeholder 2">
+            <a:extLst>
+              <a:ext uri="{FF2B5EF4-FFF2-40B4-BE49-F238E27FC236}">
+                <a16:creationId xmlns:a16="http://schemas.microsoft.com/office/drawing/2014/main" id="{7A661F63-853A-4E61-8A50-998C03A0011E}"/>
+              </a:ext>
+            </a:extLst>
+          </p:cNvPr>
+          <p:cNvSpPr>
+            <a:spLocks noGrp="1"/>
+          </p:cNvSpPr>
+          <p:nvPr>
+            <p:ph idx="1"/>
+          </p:nvPr>
+        </p:nvSpPr>
+        <p:spPr>
+          <a:xfrm>
+            <a:off x="838200" y="1825625"/>
+            <a:ext cx="4237383" cy="4351338"/>
+          </a:xfrm>
+        </p:spPr>
+        <p:txBody>
+          <a:bodyPr/>
+          <a:lstStyle/>
+          <a:p>
+            <a:r>
+              <a:rPr lang="en-US" dirty="0"/>
+              <a:t>These are *indispensable* </a:t>
+            </a:r>
+          </a:p>
+          <a:p>
+            <a:r>
+              <a:rPr lang="en-US" dirty="0">
+                <a:hlinkClick r:id="rId2"/>
+              </a:rPr>
+              <a:t>https://www.rstudio.com/resources/cheatsheets/</a:t>
+            </a:r>
+            <a:endParaRPr lang="en-US" dirty="0"/>
+          </a:p>
+          <a:p>
+            <a:endParaRPr lang="en-US" dirty="0"/>
+          </a:p>
+        </p:txBody>
+      </p:sp>
+      <p:pic>
+        <p:nvPicPr>
+          <p:cNvPr id="4" name="Picture 3">
+            <a:extLst>
+              <a:ext uri="{FF2B5EF4-FFF2-40B4-BE49-F238E27FC236}">
+                <a16:creationId xmlns:a16="http://schemas.microsoft.com/office/drawing/2014/main" id="{C9006DB1-E112-40C6-AE9B-4080F9398EAF}"/>
+              </a:ext>
+            </a:extLst>
+          </p:cNvPr>
+          <p:cNvPicPr>
+            <a:picLocks noChangeAspect="1"/>
+          </p:cNvPicPr>
+          <p:nvPr/>
+        </p:nvPicPr>
+        <p:blipFill>
+          <a:blip r:embed="rId3"/>
+          <a:stretch>
+            <a:fillRect/>
+          </a:stretch>
+        </p:blipFill>
+        <p:spPr>
+          <a:xfrm>
+            <a:off x="5447886" y="1437447"/>
+            <a:ext cx="5905914" cy="3549916"/>
+          </a:xfrm>
+          <a:prstGeom prst="rect">
+            <a:avLst/>
+          </a:prstGeom>
+          <a:effectLst>
+            <a:outerShdw blurRad="50800" dist="38100" algn="l" rotWithShape="0">
+              <a:prstClr val="black">
+                <a:alpha val="40000"/>
+              </a:prstClr>
+            </a:outerShdw>
+          </a:effectLst>
+        </p:spPr>
+      </p:pic>
+    </p:spTree>
+    <p:extLst>
+      <p:ext uri="{BB962C8B-B14F-4D97-AF65-F5344CB8AC3E}">
+        <p14:creationId xmlns:p14="http://schemas.microsoft.com/office/powerpoint/2010/main" val="1651112429"/>
+      </p:ext>
+    </p:extLst>
+  </p:cSld>
+  <p:clrMapOvr>
+    <a:masterClrMapping/>
+  </p:clrMapOvr>
+</p:sld>
+</file>
+
+<file path=ppt/slides/slide6.xml><?xml version="1.0" encoding="utf-8"?>
+<p:sld xmlns:a="http://schemas.openxmlformats.org/drawingml/2006/main" xmlns:r="http://schemas.openxmlformats.org/officeDocument/2006/relationships" xmlns:p="http://schemas.openxmlformats.org/presentationml/2006/main">
+  <p:cSld>
+    <p:spTree>
+      <p:nvGrpSpPr>
+        <p:cNvPr id="1" name=""/>
+        <p:cNvGrpSpPr/>
+        <p:nvPr/>
+      </p:nvGrpSpPr>
+      <p:grpSpPr>
+        <a:xfrm>
+          <a:off x="0" y="0"/>
+          <a:ext cx="0" cy="0"/>
+          <a:chOff x="0" y="0"/>
+          <a:chExt cx="0" cy="0"/>
+        </a:xfrm>
+      </p:grpSpPr>
+      <p:sp>
+        <p:nvSpPr>
           <p:cNvPr id="2" name="Title 1"/>
           <p:cNvSpPr>
             <a:spLocks noGrp="1"/>
@@ -3267,16 +3714,15 @@
           <a:lstStyle/>
           <a:p>
             <a:r>
-              <a:rPr lang="en-US" dirty="0" smtClean="0">
+              <a:rPr lang="en-US" dirty="0">
                 <a:hlinkClick r:id="rId2"/>
               </a:rPr>
               <a:t>www.Stackoverflow.com</a:t>
             </a:r>
             <a:r>
-              <a:rPr lang="en-US" dirty="0" smtClean="0"/>
+              <a:rPr lang="en-US" dirty="0"/>
               <a:t>  </a:t>
             </a:r>
-            <a:endParaRPr lang="en-US" dirty="0"/>
           </a:p>
         </p:txBody>
       </p:sp>
@@ -3314,17 +3760,10 @@
   <p:clrMapOvr>
     <a:masterClrMapping/>
   </p:clrMapOvr>
-  <p:timing>
-    <p:tnLst>
-      <p:par>
-        <p:cTn id="1" dur="indefinite" restart="never" nodeType="tmRoot"/>
-      </p:par>
-    </p:tnLst>
-  </p:timing>
 </p:sld>
 </file>
 
-<file path=ppt/slides/slide4.xml><?xml version="1.0" encoding="utf-8"?>
+<file path=ppt/slides/slide7.xml><?xml version="1.0" encoding="utf-8"?>
 <p:sld xmlns:a="http://schemas.openxmlformats.org/drawingml/2006/main" xmlns:r="http://schemas.openxmlformats.org/officeDocument/2006/relationships" xmlns:p="http://schemas.openxmlformats.org/presentationml/2006/main">
   <p:cSld>
     <p:spTree>
@@ -3357,16 +3796,15 @@
           <a:lstStyle/>
           <a:p>
             <a:r>
-              <a:rPr lang="en-US" dirty="0" smtClean="0">
+              <a:rPr lang="en-US" dirty="0">
                 <a:hlinkClick r:id="rId2"/>
               </a:rPr>
               <a:t>cran.r-project.org/manuals.html</a:t>
             </a:r>
             <a:r>
-              <a:rPr lang="en-US" dirty="0" smtClean="0"/>
+              <a:rPr lang="en-US" dirty="0"/>
               <a:t> </a:t>
             </a:r>
-            <a:endParaRPr lang="en-US" dirty="0"/>
           </a:p>
         </p:txBody>
       </p:sp>
@@ -3404,379 +3842,6 @@
   <p:clrMapOvr>
     <a:masterClrMapping/>
   </p:clrMapOvr>
-  <p:timing>
-    <p:tnLst>
-      <p:par>
-        <p:cTn id="1" dur="indefinite" restart="never" nodeType="tmRoot"/>
-      </p:par>
-    </p:tnLst>
-  </p:timing>
-</p:sld>
-</file>
-
-<file path=ppt/slides/slide5.xml><?xml version="1.0" encoding="utf-8"?>
-<p:sld xmlns:a="http://schemas.openxmlformats.org/drawingml/2006/main" xmlns:r="http://schemas.openxmlformats.org/officeDocument/2006/relationships" xmlns:p="http://schemas.openxmlformats.org/presentationml/2006/main">
-  <p:cSld>
-    <p:spTree>
-      <p:nvGrpSpPr>
-        <p:cNvPr id="1" name=""/>
-        <p:cNvGrpSpPr/>
-        <p:nvPr/>
-      </p:nvGrpSpPr>
-      <p:grpSpPr>
-        <a:xfrm>
-          <a:off x="0" y="0"/>
-          <a:ext cx="0" cy="0"/>
-          <a:chOff x="0" y="0"/>
-          <a:chExt cx="0" cy="0"/>
-        </a:xfrm>
-      </p:grpSpPr>
-      <p:sp>
-        <p:nvSpPr>
-          <p:cNvPr id="2" name="Title 1"/>
-          <p:cNvSpPr>
-            <a:spLocks noGrp="1"/>
-          </p:cNvSpPr>
-          <p:nvPr>
-            <p:ph type="title"/>
-          </p:nvPr>
-        </p:nvSpPr>
-        <p:spPr/>
-        <p:txBody>
-          <a:bodyPr/>
-          <a:lstStyle/>
-          <a:p>
-            <a:r>
-              <a:rPr lang="en-US" dirty="0" smtClean="0">
-                <a:hlinkClick r:id="rId2"/>
-              </a:rPr>
-              <a:t>journal.r-project.org/</a:t>
-            </a:r>
-            <a:r>
-              <a:rPr lang="en-US" dirty="0" smtClean="0"/>
-              <a:t> </a:t>
-            </a:r>
-            <a:endParaRPr lang="en-US" dirty="0"/>
-          </a:p>
-        </p:txBody>
-      </p:sp>
-      <p:pic>
-        <p:nvPicPr>
-          <p:cNvPr id="4" name="Picture 3"/>
-          <p:cNvPicPr>
-            <a:picLocks noChangeAspect="1"/>
-          </p:cNvPicPr>
-          <p:nvPr/>
-        </p:nvPicPr>
-        <p:blipFill>
-          <a:blip r:embed="rId3"/>
-          <a:stretch>
-            <a:fillRect/>
-          </a:stretch>
-        </p:blipFill>
-        <p:spPr>
-          <a:xfrm>
-            <a:off x="628376" y="1555392"/>
-            <a:ext cx="10305788" cy="4755256"/>
-          </a:xfrm>
-          <a:prstGeom prst="rect">
-            <a:avLst/>
-          </a:prstGeom>
-        </p:spPr>
-      </p:pic>
-    </p:spTree>
-    <p:extLst>
-      <p:ext uri="{BB962C8B-B14F-4D97-AF65-F5344CB8AC3E}">
-        <p14:creationId xmlns:p14="http://schemas.microsoft.com/office/powerpoint/2010/main" val="2049435738"/>
-      </p:ext>
-    </p:extLst>
-  </p:cSld>
-  <p:clrMapOvr>
-    <a:masterClrMapping/>
-  </p:clrMapOvr>
-  <p:timing>
-    <p:tnLst>
-      <p:par>
-        <p:cTn id="1" dur="indefinite" restart="never" nodeType="tmRoot"/>
-      </p:par>
-    </p:tnLst>
-  </p:timing>
-</p:sld>
-</file>
-
-<file path=ppt/slides/slide6.xml><?xml version="1.0" encoding="utf-8"?>
-<p:sld xmlns:a="http://schemas.openxmlformats.org/drawingml/2006/main" xmlns:r="http://schemas.openxmlformats.org/officeDocument/2006/relationships" xmlns:p="http://schemas.openxmlformats.org/presentationml/2006/main">
-  <p:cSld>
-    <p:spTree>
-      <p:nvGrpSpPr>
-        <p:cNvPr id="1" name=""/>
-        <p:cNvGrpSpPr/>
-        <p:nvPr/>
-      </p:nvGrpSpPr>
-      <p:grpSpPr>
-        <a:xfrm>
-          <a:off x="0" y="0"/>
-          <a:ext cx="0" cy="0"/>
-          <a:chOff x="0" y="0"/>
-          <a:chExt cx="0" cy="0"/>
-        </a:xfrm>
-      </p:grpSpPr>
-      <p:sp>
-        <p:nvSpPr>
-          <p:cNvPr id="2" name="Title 1"/>
-          <p:cNvSpPr>
-            <a:spLocks noGrp="1"/>
-          </p:cNvSpPr>
-          <p:nvPr>
-            <p:ph type="title"/>
-          </p:nvPr>
-        </p:nvSpPr>
-        <p:spPr/>
-        <p:txBody>
-          <a:bodyPr/>
-          <a:lstStyle/>
-          <a:p>
-            <a:r>
-              <a:rPr lang="en-US" dirty="0" smtClean="0">
-                <a:hlinkClick r:id="rId2"/>
-              </a:rPr>
-              <a:t>blog.rstudio.org/</a:t>
-            </a:r>
-            <a:r>
-              <a:rPr lang="en-US" dirty="0" smtClean="0"/>
-              <a:t> </a:t>
-            </a:r>
-            <a:endParaRPr lang="en-US" dirty="0"/>
-          </a:p>
-        </p:txBody>
-      </p:sp>
-      <p:sp>
-        <p:nvSpPr>
-          <p:cNvPr id="3" name="Content Placeholder 2"/>
-          <p:cNvSpPr>
-            <a:spLocks noGrp="1"/>
-          </p:cNvSpPr>
-          <p:nvPr>
-            <p:ph idx="1"/>
-          </p:nvPr>
-        </p:nvSpPr>
-        <p:spPr>
-          <a:xfrm>
-            <a:off x="838200" y="1825625"/>
-            <a:ext cx="3115614" cy="4351338"/>
-          </a:xfrm>
-        </p:spPr>
-        <p:txBody>
-          <a:bodyPr/>
-          <a:lstStyle/>
-          <a:p>
-            <a:r>
-              <a:rPr lang="en-US" dirty="0" smtClean="0"/>
-              <a:t>Source of videos</a:t>
-            </a:r>
-          </a:p>
-          <a:p>
-            <a:r>
-              <a:rPr lang="en-US" dirty="0" smtClean="0"/>
-              <a:t>Package Announcements</a:t>
-            </a:r>
-            <a:endParaRPr lang="en-US" dirty="0"/>
-          </a:p>
-        </p:txBody>
-      </p:sp>
-      <p:pic>
-        <p:nvPicPr>
-          <p:cNvPr id="4" name="Picture 3"/>
-          <p:cNvPicPr>
-            <a:picLocks noChangeAspect="1"/>
-          </p:cNvPicPr>
-          <p:nvPr/>
-        </p:nvPicPr>
-        <p:blipFill>
-          <a:blip r:embed="rId3"/>
-          <a:stretch>
-            <a:fillRect/>
-          </a:stretch>
-        </p:blipFill>
-        <p:spPr>
-          <a:xfrm>
-            <a:off x="5577693" y="1722164"/>
-            <a:ext cx="5588290" cy="4717273"/>
-          </a:xfrm>
-          <a:prstGeom prst="rect">
-            <a:avLst/>
-          </a:prstGeom>
-        </p:spPr>
-      </p:pic>
-    </p:spTree>
-    <p:extLst>
-      <p:ext uri="{BB962C8B-B14F-4D97-AF65-F5344CB8AC3E}">
-        <p14:creationId xmlns:p14="http://schemas.microsoft.com/office/powerpoint/2010/main" val="2385703056"/>
-      </p:ext>
-    </p:extLst>
-  </p:cSld>
-  <p:clrMapOvr>
-    <a:masterClrMapping/>
-  </p:clrMapOvr>
-  <p:timing>
-    <p:tnLst>
-      <p:par>
-        <p:cTn id="1" dur="indefinite" restart="never" nodeType="tmRoot"/>
-      </p:par>
-    </p:tnLst>
-  </p:timing>
-</p:sld>
-</file>
-
-<file path=ppt/slides/slide7.xml><?xml version="1.0" encoding="utf-8"?>
-<p:sld xmlns:a="http://schemas.openxmlformats.org/drawingml/2006/main" xmlns:r="http://schemas.openxmlformats.org/officeDocument/2006/relationships" xmlns:p="http://schemas.openxmlformats.org/presentationml/2006/main">
-  <p:cSld>
-    <p:spTree>
-      <p:nvGrpSpPr>
-        <p:cNvPr id="1" name=""/>
-        <p:cNvGrpSpPr/>
-        <p:nvPr/>
-      </p:nvGrpSpPr>
-      <p:grpSpPr>
-        <a:xfrm>
-          <a:off x="0" y="0"/>
-          <a:ext cx="0" cy="0"/>
-          <a:chOff x="0" y="0"/>
-          <a:chExt cx="0" cy="0"/>
-        </a:xfrm>
-      </p:grpSpPr>
-      <p:sp>
-        <p:nvSpPr>
-          <p:cNvPr id="2" name="Title 1"/>
-          <p:cNvSpPr>
-            <a:spLocks noGrp="1"/>
-          </p:cNvSpPr>
-          <p:nvPr>
-            <p:ph type="title"/>
-          </p:nvPr>
-        </p:nvSpPr>
-        <p:spPr/>
-        <p:txBody>
-          <a:bodyPr/>
-          <a:lstStyle/>
-          <a:p>
-            <a:r>
-              <a:rPr lang="en-US" dirty="0" smtClean="0">
-                <a:hlinkClick r:id="rId2"/>
-              </a:rPr>
-              <a:t>www.coursera.org</a:t>
-            </a:r>
-            <a:r>
-              <a:rPr lang="en-US" dirty="0" smtClean="0"/>
-              <a:t> </a:t>
-            </a:r>
-            <a:endParaRPr lang="en-US" dirty="0"/>
-          </a:p>
-        </p:txBody>
-      </p:sp>
-      <p:pic>
-        <p:nvPicPr>
-          <p:cNvPr id="4" name="Content Placeholder 3"/>
-          <p:cNvPicPr>
-            <a:picLocks noGrp="1" noChangeAspect="1"/>
-          </p:cNvPicPr>
-          <p:nvPr>
-            <p:ph idx="1"/>
-          </p:nvPr>
-        </p:nvPicPr>
-        <p:blipFill>
-          <a:blip r:embed="rId3"/>
-          <a:stretch>
-            <a:fillRect/>
-          </a:stretch>
-        </p:blipFill>
-        <p:spPr>
-          <a:xfrm>
-            <a:off x="6480563" y="1690688"/>
-            <a:ext cx="4873237" cy="4351338"/>
-          </a:xfrm>
-          <a:prstGeom prst="rect">
-            <a:avLst/>
-          </a:prstGeom>
-        </p:spPr>
-      </p:pic>
-      <p:sp>
-        <p:nvSpPr>
-          <p:cNvPr id="5" name="TextBox 4"/>
-          <p:cNvSpPr txBox="1"/>
-          <p:nvPr/>
-        </p:nvSpPr>
-        <p:spPr>
-          <a:xfrm>
-            <a:off x="838200" y="1780840"/>
-            <a:ext cx="5098961" cy="2523768"/>
-          </a:xfrm>
-          <a:prstGeom prst="rect">
-            <a:avLst/>
-          </a:prstGeom>
-          <a:noFill/>
-        </p:spPr>
-        <p:txBody>
-          <a:bodyPr wrap="square" rtlCol="0">
-            <a:spAutoFit/>
-          </a:bodyPr>
-          <a:lstStyle/>
-          <a:p>
-            <a:pPr marL="285750" indent="-285750">
-              <a:buFont typeface="Arial" panose="020B0604020202020204" pitchFamily="34" charset="0"/>
-              <a:buChar char="•"/>
-            </a:pPr>
-            <a:r>
-              <a:rPr lang="en-US" sz="2800" dirty="0" smtClean="0"/>
-              <a:t>Johns Hopkins offers a specialization in Data Science with a certificate</a:t>
-            </a:r>
-          </a:p>
-          <a:p>
-            <a:pPr marL="285750" indent="-285750">
-              <a:buFont typeface="Arial" panose="020B0604020202020204" pitchFamily="34" charset="0"/>
-              <a:buChar char="•"/>
-            </a:pPr>
-            <a:r>
-              <a:rPr lang="en-US" sz="2800" dirty="0" smtClean="0"/>
-              <a:t>Instructors’ blog is </a:t>
-            </a:r>
-            <a:r>
-              <a:rPr lang="en-US" sz="2800" dirty="0" smtClean="0">
-                <a:hlinkClick r:id="rId4"/>
-              </a:rPr>
-              <a:t>www.simplystatistics.org</a:t>
-            </a:r>
-            <a:r>
-              <a:rPr lang="en-US" sz="2800" dirty="0" smtClean="0"/>
-              <a:t>   </a:t>
-            </a:r>
-          </a:p>
-          <a:p>
-            <a:pPr marL="285750" indent="-285750">
-              <a:buFont typeface="Arial" panose="020B0604020202020204" pitchFamily="34" charset="0"/>
-              <a:buChar char="•"/>
-            </a:pPr>
-            <a:endParaRPr lang="en-US" dirty="0"/>
-          </a:p>
-        </p:txBody>
-      </p:sp>
-    </p:spTree>
-    <p:extLst>
-      <p:ext uri="{BB962C8B-B14F-4D97-AF65-F5344CB8AC3E}">
-        <p14:creationId xmlns:p14="http://schemas.microsoft.com/office/powerpoint/2010/main" val="2911492810"/>
-      </p:ext>
-    </p:extLst>
-  </p:cSld>
-  <p:clrMapOvr>
-    <a:masterClrMapping/>
-  </p:clrMapOvr>
-  <p:timing>
-    <p:tnLst>
-      <p:par>
-        <p:cTn id="1" dur="indefinite" restart="never" nodeType="tmRoot"/>
-      </p:par>
-    </p:tnLst>
-  </p:timing>
 </p:sld>
 </file>
 
@@ -3813,16 +3878,159 @@
           <a:lstStyle/>
           <a:p>
             <a:r>
-              <a:rPr lang="en-US" dirty="0" smtClean="0">
+              <a:rPr lang="en-US" dirty="0">
+                <a:hlinkClick r:id="rId2"/>
+              </a:rPr>
+              <a:t>www.coursera.org</a:t>
+            </a:r>
+            <a:r>
+              <a:rPr lang="en-US" dirty="0"/>
+              <a:t> </a:t>
+            </a:r>
+          </a:p>
+        </p:txBody>
+      </p:sp>
+      <p:pic>
+        <p:nvPicPr>
+          <p:cNvPr id="4" name="Content Placeholder 3"/>
+          <p:cNvPicPr>
+            <a:picLocks noGrp="1" noChangeAspect="1"/>
+          </p:cNvPicPr>
+          <p:nvPr>
+            <p:ph idx="1"/>
+          </p:nvPr>
+        </p:nvPicPr>
+        <p:blipFill>
+          <a:blip r:embed="rId3"/>
+          <a:stretch>
+            <a:fillRect/>
+          </a:stretch>
+        </p:blipFill>
+        <p:spPr>
+          <a:xfrm>
+            <a:off x="6480563" y="1690688"/>
+            <a:ext cx="4873237" cy="4351338"/>
+          </a:xfrm>
+          <a:prstGeom prst="rect">
+            <a:avLst/>
+          </a:prstGeom>
+        </p:spPr>
+      </p:pic>
+      <p:sp>
+        <p:nvSpPr>
+          <p:cNvPr id="5" name="TextBox 4"/>
+          <p:cNvSpPr txBox="1"/>
+          <p:nvPr/>
+        </p:nvSpPr>
+        <p:spPr>
+          <a:xfrm>
+            <a:off x="838200" y="1780840"/>
+            <a:ext cx="5098961" cy="2523768"/>
+          </a:xfrm>
+          <a:prstGeom prst="rect">
+            <a:avLst/>
+          </a:prstGeom>
+          <a:noFill/>
+        </p:spPr>
+        <p:txBody>
+          <a:bodyPr wrap="square" rtlCol="0">
+            <a:spAutoFit/>
+          </a:bodyPr>
+          <a:lstStyle/>
+          <a:p>
+            <a:pPr marL="285750" indent="-285750">
+              <a:buFont typeface="Arial" panose="020B0604020202020204" pitchFamily="34" charset="0"/>
+              <a:buChar char="•"/>
+            </a:pPr>
+            <a:r>
+              <a:rPr lang="en-US" sz="2800" dirty="0"/>
+              <a:t>Johns Hopkins offers a specialization in Data Science with a certificate</a:t>
+            </a:r>
+          </a:p>
+          <a:p>
+            <a:pPr marL="285750" indent="-285750">
+              <a:buFont typeface="Arial" panose="020B0604020202020204" pitchFamily="34" charset="0"/>
+              <a:buChar char="•"/>
+            </a:pPr>
+            <a:r>
+              <a:rPr lang="en-US" sz="2800" dirty="0"/>
+              <a:t>Instructors’ blog is </a:t>
+            </a:r>
+            <a:r>
+              <a:rPr lang="en-US" sz="2800" dirty="0">
+                <a:hlinkClick r:id="rId4"/>
+              </a:rPr>
+              <a:t>www.simplystatistics.org</a:t>
+            </a:r>
+            <a:r>
+              <a:rPr lang="en-US" sz="2800" dirty="0"/>
+              <a:t>   </a:t>
+            </a:r>
+          </a:p>
+          <a:p>
+            <a:pPr marL="285750" indent="-285750">
+              <a:buFont typeface="Arial" panose="020B0604020202020204" pitchFamily="34" charset="0"/>
+              <a:buChar char="•"/>
+            </a:pPr>
+            <a:endParaRPr lang="en-US" dirty="0"/>
+          </a:p>
+        </p:txBody>
+      </p:sp>
+    </p:spTree>
+    <p:extLst>
+      <p:ext uri="{BB962C8B-B14F-4D97-AF65-F5344CB8AC3E}">
+        <p14:creationId xmlns:p14="http://schemas.microsoft.com/office/powerpoint/2010/main" val="2911492810"/>
+      </p:ext>
+    </p:extLst>
+  </p:cSld>
+  <p:clrMapOvr>
+    <a:masterClrMapping/>
+  </p:clrMapOvr>
+</p:sld>
+</file>
+
+<file path=ppt/slides/slide9.xml><?xml version="1.0" encoding="utf-8"?>
+<p:sld xmlns:a="http://schemas.openxmlformats.org/drawingml/2006/main" xmlns:r="http://schemas.openxmlformats.org/officeDocument/2006/relationships" xmlns:p="http://schemas.openxmlformats.org/presentationml/2006/main">
+  <p:cSld>
+    <p:spTree>
+      <p:nvGrpSpPr>
+        <p:cNvPr id="1" name=""/>
+        <p:cNvGrpSpPr/>
+        <p:nvPr/>
+      </p:nvGrpSpPr>
+      <p:grpSpPr>
+        <a:xfrm>
+          <a:off x="0" y="0"/>
+          <a:ext cx="0" cy="0"/>
+          <a:chOff x="0" y="0"/>
+          <a:chExt cx="0" cy="0"/>
+        </a:xfrm>
+      </p:grpSpPr>
+      <p:sp>
+        <p:nvSpPr>
+          <p:cNvPr id="2" name="Title 1"/>
+          <p:cNvSpPr>
+            <a:spLocks noGrp="1"/>
+          </p:cNvSpPr>
+          <p:nvPr>
+            <p:ph type="title"/>
+          </p:nvPr>
+        </p:nvSpPr>
+        <p:spPr/>
+        <p:txBody>
+          <a:bodyPr/>
+          <a:lstStyle/>
+          <a:p>
+            <a:r>
+              <a:rPr lang="en-US" dirty="0">
                 <a:hlinkClick r:id="rId2"/>
               </a:rPr>
               <a:t>www.kaggle.com</a:t>
             </a:r>
             <a:r>
-              <a:rPr lang="en-US" dirty="0" smtClean="0"/>
+              <a:rPr lang="en-US" dirty="0"/>
               <a:t> </a:t>
             </a:r>
-            <a:endParaRPr lang="en-US" dirty="0"/>
           </a:p>
         </p:txBody>
       </p:sp>
@@ -3852,62 +4060,57 @@
               <a:buNone/>
             </a:pPr>
             <a:r>
-              <a:rPr lang="en-US" sz="3300" u="sng" dirty="0" smtClean="0"/>
+              <a:rPr lang="en-US" sz="3300" u="sng" dirty="0"/>
               <a:t>Insurance Competitions</a:t>
             </a:r>
           </a:p>
           <a:p>
             <a:r>
-              <a:rPr lang="en-US" dirty="0" smtClean="0"/>
+              <a:rPr lang="en-US" dirty="0"/>
               <a:t>Allstate Purchase Prediction Challenge</a:t>
             </a:r>
           </a:p>
           <a:p>
             <a:r>
-              <a:rPr lang="en-US" dirty="0" smtClean="0"/>
+              <a:rPr lang="en-US" dirty="0"/>
               <a:t>Liberty Mutual </a:t>
             </a:r>
             <a:r>
-              <a:rPr lang="en-US" dirty="0" err="1" smtClean="0"/>
+              <a:rPr lang="en-US" dirty="0" err="1"/>
               <a:t>Group:Fire</a:t>
             </a:r>
             <a:r>
-              <a:rPr lang="en-US" dirty="0" smtClean="0"/>
+              <a:rPr lang="en-US" dirty="0"/>
               <a:t> Peril Loss Cost</a:t>
             </a:r>
           </a:p>
           <a:p>
             <a:r>
-              <a:rPr lang="en-US" dirty="0" smtClean="0"/>
+              <a:rPr lang="en-US" dirty="0"/>
               <a:t>AXA Driver Telematics Analysis</a:t>
             </a:r>
           </a:p>
           <a:p>
             <a:r>
-              <a:rPr lang="en-US" dirty="0" err="1" smtClean="0"/>
+              <a:rPr lang="en-US" dirty="0" err="1"/>
               <a:t>Homesite</a:t>
             </a:r>
             <a:r>
-              <a:rPr lang="en-US" dirty="0" smtClean="0"/>
+              <a:rPr lang="en-US" dirty="0"/>
               <a:t> Quote Conversion </a:t>
             </a:r>
           </a:p>
           <a:p>
             <a:r>
               <a:rPr lang="en-US" dirty="0"/>
-              <a:t>Liberty Mutual Group</a:t>
-            </a:r>
-            <a:r>
-              <a:rPr lang="en-US" dirty="0" smtClean="0"/>
-              <a:t>: Property Inspection Prediction</a:t>
-            </a:r>
-          </a:p>
-          <a:p>
-            <a:r>
-              <a:rPr lang="en-US" dirty="0" smtClean="0"/>
+              <a:t>Liberty Mutual Group: Property Inspection Prediction</a:t>
+            </a:r>
+          </a:p>
+          <a:p>
+            <a:r>
+              <a:rPr lang="en-US" dirty="0"/>
               <a:t>Allstate Claim Prediction Challenge</a:t>
             </a:r>
-            <a:endParaRPr lang="en-US" dirty="0"/>
           </a:p>
           <a:p>
             <a:endParaRPr lang="en-US" dirty="0"/>
@@ -3948,109 +4151,6 @@
   <p:clrMapOvr>
     <a:masterClrMapping/>
   </p:clrMapOvr>
-  <p:timing>
-    <p:tnLst>
-      <p:par>
-        <p:cTn id="1" dur="indefinite" restart="never" nodeType="tmRoot"/>
-      </p:par>
-    </p:tnLst>
-  </p:timing>
-</p:sld>
-</file>
-
-<file path=ppt/slides/slide9.xml><?xml version="1.0" encoding="utf-8"?>
-<p:sld xmlns:a="http://schemas.openxmlformats.org/drawingml/2006/main" xmlns:r="http://schemas.openxmlformats.org/officeDocument/2006/relationships" xmlns:p="http://schemas.openxmlformats.org/presentationml/2006/main">
-  <p:cSld>
-    <p:spTree>
-      <p:nvGrpSpPr>
-        <p:cNvPr id="1" name=""/>
-        <p:cNvGrpSpPr/>
-        <p:nvPr/>
-      </p:nvGrpSpPr>
-      <p:grpSpPr>
-        <a:xfrm>
-          <a:off x="0" y="0"/>
-          <a:ext cx="0" cy="0"/>
-          <a:chOff x="0" y="0"/>
-          <a:chExt cx="0" cy="0"/>
-        </a:xfrm>
-      </p:grpSpPr>
-      <p:sp>
-        <p:nvSpPr>
-          <p:cNvPr id="2" name="Title 1"/>
-          <p:cNvSpPr>
-            <a:spLocks noGrp="1"/>
-          </p:cNvSpPr>
-          <p:nvPr>
-            <p:ph type="title"/>
-          </p:nvPr>
-        </p:nvSpPr>
-        <p:spPr/>
-        <p:txBody>
-          <a:bodyPr/>
-          <a:lstStyle/>
-          <a:p>
-            <a:r>
-              <a:rPr lang="en-US" dirty="0">
-                <a:hlinkClick r:id="rId2"/>
-              </a:rPr>
-              <a:t>http://www.r-bloggers.com</a:t>
-            </a:r>
-            <a:r>
-              <a:rPr lang="en-US" dirty="0" smtClean="0">
-                <a:hlinkClick r:id="rId2"/>
-              </a:rPr>
-              <a:t>/</a:t>
-            </a:r>
-            <a:r>
-              <a:rPr lang="en-US" dirty="0" smtClean="0"/>
-              <a:t> </a:t>
-            </a:r>
-            <a:endParaRPr lang="en-US" dirty="0"/>
-          </a:p>
-        </p:txBody>
-      </p:sp>
-      <p:pic>
-        <p:nvPicPr>
-          <p:cNvPr id="4" name="Picture 3"/>
-          <p:cNvPicPr>
-            <a:picLocks noChangeAspect="1"/>
-          </p:cNvPicPr>
-          <p:nvPr/>
-        </p:nvPicPr>
-        <p:blipFill>
-          <a:blip r:embed="rId3"/>
-          <a:stretch>
-            <a:fillRect/>
-          </a:stretch>
-        </p:blipFill>
-        <p:spPr>
-          <a:xfrm>
-            <a:off x="2998865" y="1732880"/>
-            <a:ext cx="6678615" cy="4302256"/>
-          </a:xfrm>
-          <a:prstGeom prst="rect">
-            <a:avLst/>
-          </a:prstGeom>
-        </p:spPr>
-      </p:pic>
-    </p:spTree>
-    <p:extLst>
-      <p:ext uri="{BB962C8B-B14F-4D97-AF65-F5344CB8AC3E}">
-        <p14:creationId xmlns:p14="http://schemas.microsoft.com/office/powerpoint/2010/main" val="1400083673"/>
-      </p:ext>
-    </p:extLst>
-  </p:cSld>
-  <p:clrMapOvr>
-    <a:masterClrMapping/>
-  </p:clrMapOvr>
-  <p:timing>
-    <p:tnLst>
-      <p:par>
-        <p:cTn id="1" dur="indefinite" restart="never" nodeType="tmRoot"/>
-      </p:par>
-    </p:tnLst>
-  </p:timing>
 </p:sld>
 </file>
 
@@ -4309,7 +4409,7 @@
   <a:extraClrSchemeLst/>
   <a:extLst>
     <a:ext uri="{05A4C25C-085E-4340-85A3-A5531E510DB2}">
-      <thm15:themeFamily xmlns:thm15="http://schemas.microsoft.com/office/thememl/2012/main" xmlns="" name="Office Theme" id="{62F939B6-93AF-4DB8-9C6B-D6C7DFDC589F}" vid="{4A3C46E8-61CC-4603-A589-7422A47A8E4A}"/>
+      <thm15:themeFamily xmlns:thm15="http://schemas.microsoft.com/office/thememl/2012/main" name="Office Theme" id="{62F939B6-93AF-4DB8-9C6B-D6C7DFDC589F}" vid="{4A3C46E8-61CC-4603-A589-7422A47A8E4A}"/>
     </a:ext>
   </a:extLst>
 </a:theme>

</xml_diff>